<commit_message>
massive cleanup, shifting to using Agate instead of Excel.
</commit_message>
<xml_diff>
--- a/Lectures/Chartjunk.pptx
+++ b/Lectures/Chartjunk.pptx
@@ -6,15 +6,16 @@
   </p:sldMasterIdLst>
   <p:sldIdLst>
     <p:sldId id="256" r:id="rId2"/>
-    <p:sldId id="257" r:id="rId3"/>
-    <p:sldId id="258" r:id="rId4"/>
-    <p:sldId id="259" r:id="rId5"/>
-    <p:sldId id="260" r:id="rId6"/>
-    <p:sldId id="261" r:id="rId7"/>
-    <p:sldId id="262" r:id="rId8"/>
-    <p:sldId id="263" r:id="rId9"/>
-    <p:sldId id="264" r:id="rId10"/>
-    <p:sldId id="265" r:id="rId11"/>
+    <p:sldId id="266" r:id="rId3"/>
+    <p:sldId id="257" r:id="rId4"/>
+    <p:sldId id="258" r:id="rId5"/>
+    <p:sldId id="259" r:id="rId6"/>
+    <p:sldId id="260" r:id="rId7"/>
+    <p:sldId id="261" r:id="rId8"/>
+    <p:sldId id="262" r:id="rId9"/>
+    <p:sldId id="263" r:id="rId10"/>
+    <p:sldId id="264" r:id="rId11"/>
+    <p:sldId id="265" r:id="rId12"/>
   </p:sldIdLst>
   <p:sldSz cx="9144000" cy="6858000" type="screen4x3"/>
   <p:notesSz cx="6858000" cy="9144000"/>
@@ -297,7 +298,7 @@
           <a:p>
             <a:fld id="{968A41A4-FE52-0A46-99DE-A5790A99B297}" type="datetimeFigureOut">
               <a:rPr lang="en-US" smtClean="0"/>
-              <a:t>2/3/15</a:t>
+              <a:t>9/13/16</a:t>
             </a:fld>
             <a:endParaRPr lang="en-US"/>
           </a:p>
@@ -467,7 +468,7 @@
           <a:p>
             <a:fld id="{968A41A4-FE52-0A46-99DE-A5790A99B297}" type="datetimeFigureOut">
               <a:rPr lang="en-US" smtClean="0"/>
-              <a:t>2/3/15</a:t>
+              <a:t>9/13/16</a:t>
             </a:fld>
             <a:endParaRPr lang="en-US"/>
           </a:p>
@@ -647,7 +648,7 @@
           <a:p>
             <a:fld id="{968A41A4-FE52-0A46-99DE-A5790A99B297}" type="datetimeFigureOut">
               <a:rPr lang="en-US" smtClean="0"/>
-              <a:t>2/3/15</a:t>
+              <a:t>9/13/16</a:t>
             </a:fld>
             <a:endParaRPr lang="en-US"/>
           </a:p>
@@ -817,7 +818,7 @@
           <a:p>
             <a:fld id="{968A41A4-FE52-0A46-99DE-A5790A99B297}" type="datetimeFigureOut">
               <a:rPr lang="en-US" smtClean="0"/>
-              <a:t>2/3/15</a:t>
+              <a:t>9/13/16</a:t>
             </a:fld>
             <a:endParaRPr lang="en-US"/>
           </a:p>
@@ -1063,7 +1064,7 @@
           <a:p>
             <a:fld id="{968A41A4-FE52-0A46-99DE-A5790A99B297}" type="datetimeFigureOut">
               <a:rPr lang="en-US" smtClean="0"/>
-              <a:t>2/3/15</a:t>
+              <a:t>9/13/16</a:t>
             </a:fld>
             <a:endParaRPr lang="en-US"/>
           </a:p>
@@ -1351,7 +1352,7 @@
           <a:p>
             <a:fld id="{968A41A4-FE52-0A46-99DE-A5790A99B297}" type="datetimeFigureOut">
               <a:rPr lang="en-US" smtClean="0"/>
-              <a:t>2/3/15</a:t>
+              <a:t>9/13/16</a:t>
             </a:fld>
             <a:endParaRPr lang="en-US"/>
           </a:p>
@@ -1773,7 +1774,7 @@
           <a:p>
             <a:fld id="{968A41A4-FE52-0A46-99DE-A5790A99B297}" type="datetimeFigureOut">
               <a:rPr lang="en-US" smtClean="0"/>
-              <a:t>2/3/15</a:t>
+              <a:t>9/13/16</a:t>
             </a:fld>
             <a:endParaRPr lang="en-US"/>
           </a:p>
@@ -1891,7 +1892,7 @@
           <a:p>
             <a:fld id="{968A41A4-FE52-0A46-99DE-A5790A99B297}" type="datetimeFigureOut">
               <a:rPr lang="en-US" smtClean="0"/>
-              <a:t>2/3/15</a:t>
+              <a:t>9/13/16</a:t>
             </a:fld>
             <a:endParaRPr lang="en-US"/>
           </a:p>
@@ -1986,7 +1987,7 @@
           <a:p>
             <a:fld id="{968A41A4-FE52-0A46-99DE-A5790A99B297}" type="datetimeFigureOut">
               <a:rPr lang="en-US" smtClean="0"/>
-              <a:t>2/3/15</a:t>
+              <a:t>9/13/16</a:t>
             </a:fld>
             <a:endParaRPr lang="en-US"/>
           </a:p>
@@ -2263,7 +2264,7 @@
           <a:p>
             <a:fld id="{968A41A4-FE52-0A46-99DE-A5790A99B297}" type="datetimeFigureOut">
               <a:rPr lang="en-US" smtClean="0"/>
-              <a:t>2/3/15</a:t>
+              <a:t>9/13/16</a:t>
             </a:fld>
             <a:endParaRPr lang="en-US"/>
           </a:p>
@@ -2516,7 +2517,7 @@
           <a:p>
             <a:fld id="{968A41A4-FE52-0A46-99DE-A5790A99B297}" type="datetimeFigureOut">
               <a:rPr lang="en-US" smtClean="0"/>
-              <a:t>2/3/15</a:t>
+              <a:t>9/13/16</a:t>
             </a:fld>
             <a:endParaRPr lang="en-US"/>
           </a:p>
@@ -2729,7 +2730,7 @@
           <a:p>
             <a:fld id="{968A41A4-FE52-0A46-99DE-A5790A99B297}" type="datetimeFigureOut">
               <a:rPr lang="en-US" smtClean="0"/>
-              <a:t>2/3/15</a:t>
+              <a:t>9/13/16</a:t>
             </a:fld>
             <a:endParaRPr lang="en-US"/>
           </a:p>
@@ -3205,6 +3206,71 @@
             <p:ph type="title"/>
           </p:nvPr>
         </p:nvSpPr>
+        <p:spPr>
+          <a:xfrm>
+            <a:off x="457200" y="2814848"/>
+            <a:ext cx="8229600" cy="1143000"/>
+          </a:xfrm>
+        </p:spPr>
+        <p:txBody>
+          <a:bodyPr/>
+          <a:lstStyle/>
+          <a:p>
+            <a:r>
+              <a:rPr lang="en-US" dirty="0" smtClean="0"/>
+              <a:t>Erasing exercise</a:t>
+            </a:r>
+            <a:endParaRPr lang="en-US" dirty="0"/>
+          </a:p>
+        </p:txBody>
+      </p:sp>
+    </p:spTree>
+    <p:extLst>
+      <p:ext uri="{BB962C8B-B14F-4D97-AF65-F5344CB8AC3E}">
+        <p14:creationId xmlns:p14="http://schemas.microsoft.com/office/powerpoint/2010/main" val="544531581"/>
+      </p:ext>
+    </p:extLst>
+  </p:cSld>
+  <p:clrMapOvr>
+    <a:masterClrMapping/>
+  </p:clrMapOvr>
+  <p:timing>
+    <p:tnLst>
+      <p:par>
+        <p:cTn xmlns:p14="http://schemas.microsoft.com/office/powerpoint/2010/main" id="1" dur="indefinite" restart="never" nodeType="tmRoot"/>
+      </p:par>
+    </p:tnLst>
+  </p:timing>
+</p:sld>
+</file>
+
+<file path=ppt/slides/slide11.xml><?xml version="1.0" encoding="utf-8"?>
+<p:sld xmlns:a="http://schemas.openxmlformats.org/drawingml/2006/main" xmlns:r="http://schemas.openxmlformats.org/officeDocument/2006/relationships" xmlns:p="http://schemas.openxmlformats.org/presentationml/2006/main">
+  <p:cSld>
+    <p:spTree>
+      <p:nvGrpSpPr>
+        <p:cNvPr id="1" name=""/>
+        <p:cNvGrpSpPr/>
+        <p:nvPr/>
+      </p:nvGrpSpPr>
+      <p:grpSpPr>
+        <a:xfrm>
+          <a:off x="0" y="0"/>
+          <a:ext cx="0" cy="0"/>
+          <a:chOff x="0" y="0"/>
+          <a:chExt cx="0" cy="0"/>
+        </a:xfrm>
+      </p:grpSpPr>
+      <p:sp>
+        <p:nvSpPr>
+          <p:cNvPr id="2" name="Title 1"/>
+          <p:cNvSpPr>
+            <a:spLocks noGrp="1"/>
+          </p:cNvSpPr>
+          <p:nvPr>
+            <p:ph type="title"/>
+          </p:nvPr>
+        </p:nvSpPr>
         <p:spPr/>
         <p:txBody>
           <a:bodyPr/>
@@ -3234,14 +3300,22 @@
           <a:lstStyle/>
           <a:p>
             <a:r>
+              <a:rPr lang="en-US" dirty="0"/>
+              <a:t>Look for three data visualizations -- in print, online, wherever -- and bring to class on Tuesday. Read </a:t>
+            </a:r>
+            <a:r>
               <a:rPr lang="en-US" dirty="0" smtClean="0"/>
-              <a:t>There will be no class on Thursday. I’ll be in the air on the way to New York. So … enjoy. </a:t>
-            </a:r>
-          </a:p>
-          <a:p>
+              <a:t>the </a:t>
+            </a:r>
+            <a:r>
+              <a:rPr lang="en-US" dirty="0" smtClean="0">
+                <a:hlinkClick r:id="rId2"/>
+              </a:rPr>
+              <a:t>Junk Chart Trifecta</a:t>
+            </a:r>
             <a:r>
               <a:rPr lang="en-US" dirty="0" smtClean="0"/>
-              <a:t>THERE WILL BE AN ASSIGNMENT. To be announced. It will be an introduction to Tableau. Still working on exact details. </a:t>
+              <a:t> and label each of your three data visualizations using the rubric in that post. Be prepared to discuss on Thursday.</a:t>
             </a:r>
           </a:p>
           <a:p>
@@ -3250,28 +3324,15 @@
               <a:t>Read </a:t>
             </a:r>
             <a:r>
-              <a:rPr lang="en-US" dirty="0" err="1" smtClean="0"/>
-              <a:t>Tufte</a:t>
-            </a:r>
-            <a:r>
-              <a:rPr lang="en-US" dirty="0" smtClean="0"/>
-              <a:t> 2 and 3. </a:t>
-            </a:r>
-          </a:p>
-          <a:p>
-            <a:r>
-              <a:rPr lang="en-US" dirty="0" smtClean="0"/>
-              <a:t>Read additional links on the course schedule on </a:t>
-            </a:r>
-            <a:r>
-              <a:rPr lang="en-US" dirty="0" err="1" smtClean="0"/>
-              <a:t>Github</a:t>
-            </a:r>
-            <a:r>
-              <a:rPr lang="en-US" smtClean="0"/>
-              <a:t>.</a:t>
-            </a:r>
-            <a:endParaRPr lang="en-US"/>
+              <a:rPr lang="en-US" dirty="0" smtClean="0">
+                <a:hlinkClick r:id="rId3"/>
+              </a:rPr>
+              <a:t>Visual Literacy in the Age of Data</a:t>
+            </a:r>
+            <a:endParaRPr lang="en-US" dirty="0" smtClean="0"/>
+          </a:p>
+          <a:p>
+            <a:endParaRPr lang="en-US" dirty="0"/>
           </a:p>
         </p:txBody>
       </p:sp>
@@ -3285,6 +3346,13 @@
   <p:clrMapOvr>
     <a:masterClrMapping/>
   </p:clrMapOvr>
+  <p:timing>
+    <p:tnLst>
+      <p:par>
+        <p:cTn xmlns:p14="http://schemas.microsoft.com/office/powerpoint/2010/main" id="1" dur="indefinite" restart="never" nodeType="tmRoot"/>
+      </p:par>
+    </p:tnLst>
+  </p:timing>
 </p:sld>
 </file>
 
@@ -3307,6 +3375,72 @@
       </p:grpSpPr>
       <p:sp>
         <p:nvSpPr>
+          <p:cNvPr id="2" name="Title 1"/>
+          <p:cNvSpPr>
+            <a:spLocks noGrp="1"/>
+          </p:cNvSpPr>
+          <p:nvPr>
+            <p:ph type="title"/>
+          </p:nvPr>
+        </p:nvSpPr>
+        <p:spPr>
+          <a:xfrm>
+            <a:off x="457200" y="2802314"/>
+            <a:ext cx="8229600" cy="1143000"/>
+          </a:xfrm>
+        </p:spPr>
+        <p:txBody>
+          <a:bodyPr/>
+          <a:lstStyle/>
+          <a:p>
+            <a:r>
+              <a:rPr lang="en-US" dirty="0" err="1" smtClean="0">
+                <a:hlinkClick r:id="rId2"/>
+              </a:rPr>
+              <a:t>Tufte</a:t>
+            </a:r>
+            <a:r>
+              <a:rPr lang="en-US" dirty="0" smtClean="0">
+                <a:hlinkClick r:id="rId2"/>
+              </a:rPr>
+              <a:t> and XKCD</a:t>
+            </a:r>
+            <a:endParaRPr lang="en-US" dirty="0"/>
+          </a:p>
+        </p:txBody>
+      </p:sp>
+    </p:spTree>
+    <p:extLst>
+      <p:ext uri="{BB962C8B-B14F-4D97-AF65-F5344CB8AC3E}">
+        <p14:creationId xmlns:p14="http://schemas.microsoft.com/office/powerpoint/2010/main" val="1259255538"/>
+      </p:ext>
+    </p:extLst>
+  </p:cSld>
+  <p:clrMapOvr>
+    <a:masterClrMapping/>
+  </p:clrMapOvr>
+</p:sld>
+</file>
+
+<file path=ppt/slides/slide3.xml><?xml version="1.0" encoding="utf-8"?>
+<p:sld xmlns:a="http://schemas.openxmlformats.org/drawingml/2006/main" xmlns:r="http://schemas.openxmlformats.org/officeDocument/2006/relationships" xmlns:p="http://schemas.openxmlformats.org/presentationml/2006/main">
+  <p:cSld>
+    <p:spTree>
+      <p:nvGrpSpPr>
+        <p:cNvPr id="1" name=""/>
+        <p:cNvGrpSpPr/>
+        <p:nvPr/>
+      </p:nvGrpSpPr>
+      <p:grpSpPr>
+        <a:xfrm>
+          <a:off x="0" y="0"/>
+          <a:ext cx="0" cy="0"/>
+          <a:chOff x="0" y="0"/>
+          <a:chExt cx="0" cy="0"/>
+        </a:xfrm>
+      </p:grpSpPr>
+      <p:sp>
+        <p:nvSpPr>
           <p:cNvPr id="4" name="Title 3"/>
           <p:cNvSpPr>
             <a:spLocks noGrp="1"/>
@@ -3359,7 +3493,7 @@
 </p:sld>
 </file>
 
-<file path=ppt/slides/slide3.xml><?xml version="1.0" encoding="utf-8"?>
+<file path=ppt/slides/slide4.xml><?xml version="1.0" encoding="utf-8"?>
 <p:sld xmlns:a="http://schemas.openxmlformats.org/drawingml/2006/main" xmlns:r="http://schemas.openxmlformats.org/officeDocument/2006/relationships" xmlns:p="http://schemas.openxmlformats.org/presentationml/2006/main">
   <p:cSld>
     <p:spTree>
@@ -3434,15 +3568,7 @@
           <a:p>
             <a:r>
               <a:rPr lang="en-US" dirty="0" smtClean="0"/>
-              <a:t>Not all </a:t>
-            </a:r>
-            <a:r>
-              <a:rPr lang="en-US" dirty="0" smtClean="0"/>
-              <a:t>chart junk </a:t>
-            </a:r>
-            <a:r>
-              <a:rPr lang="en-US" dirty="0" smtClean="0"/>
-              <a:t>is artsy bolted on fluff.</a:t>
+              <a:t>Not all chart junk is artsy bolted on fluff.</a:t>
             </a:r>
           </a:p>
           <a:p>
@@ -3473,7 +3599,7 @@
 </p:sld>
 </file>
 
-<file path=ppt/slides/slide4.xml><?xml version="1.0" encoding="utf-8"?>
+<file path=ppt/slides/slide5.xml><?xml version="1.0" encoding="utf-8"?>
 <p:sld xmlns:a="http://schemas.openxmlformats.org/drawingml/2006/main" xmlns:r="http://schemas.openxmlformats.org/officeDocument/2006/relationships" xmlns:p="http://schemas.openxmlformats.org/presentationml/2006/main">
   <p:cSld>
     <p:spTree>
@@ -3556,84 +3682,6 @@
 </p:sld>
 </file>
 
-<file path=ppt/slides/slide5.xml><?xml version="1.0" encoding="utf-8"?>
-<p:sld xmlns:a="http://schemas.openxmlformats.org/drawingml/2006/main" xmlns:r="http://schemas.openxmlformats.org/officeDocument/2006/relationships" xmlns:p="http://schemas.openxmlformats.org/presentationml/2006/main">
-  <p:cSld>
-    <p:spTree>
-      <p:nvGrpSpPr>
-        <p:cNvPr id="1" name=""/>
-        <p:cNvGrpSpPr/>
-        <p:nvPr/>
-      </p:nvGrpSpPr>
-      <p:grpSpPr>
-        <a:xfrm>
-          <a:off x="0" y="0"/>
-          <a:ext cx="0" cy="0"/>
-          <a:chOff x="0" y="0"/>
-          <a:chExt cx="0" cy="0"/>
-        </a:xfrm>
-      </p:grpSpPr>
-      <p:sp>
-        <p:nvSpPr>
-          <p:cNvPr id="2" name="Title 1"/>
-          <p:cNvSpPr>
-            <a:spLocks noGrp="1"/>
-          </p:cNvSpPr>
-          <p:nvPr>
-            <p:ph type="title"/>
-          </p:nvPr>
-        </p:nvSpPr>
-        <p:spPr/>
-        <p:txBody>
-          <a:bodyPr/>
-          <a:lstStyle/>
-          <a:p>
-            <a:r>
-              <a:rPr lang="en-US" dirty="0" smtClean="0"/>
-              <a:t>Chart junk</a:t>
-            </a:r>
-            <a:endParaRPr lang="en-US" dirty="0"/>
-          </a:p>
-        </p:txBody>
-      </p:sp>
-      <p:pic>
-        <p:nvPicPr>
-          <p:cNvPr id="4" name="Content Placeholder 3" descr="dsc_5296.jpg"/>
-          <p:cNvPicPr>
-            <a:picLocks noGrp="1" noChangeAspect="1"/>
-          </p:cNvPicPr>
-          <p:nvPr>
-            <p:ph idx="1"/>
-          </p:nvPr>
-        </p:nvPicPr>
-        <p:blipFill>
-          <a:blip r:embed="rId2">
-            <a:extLst>
-              <a:ext uri="{28A0092B-C50C-407E-A947-70E740481C1C}">
-                <a14:useLocalDpi xmlns:a14="http://schemas.microsoft.com/office/drawing/2010/main" val="0"/>
-              </a:ext>
-            </a:extLst>
-          </a:blip>
-          <a:srcRect l="-10335" r="-10335"/>
-          <a:stretch>
-            <a:fillRect/>
-          </a:stretch>
-        </p:blipFill>
-        <p:spPr/>
-      </p:pic>
-    </p:spTree>
-    <p:extLst>
-      <p:ext uri="{BB962C8B-B14F-4D97-AF65-F5344CB8AC3E}">
-        <p14:creationId xmlns:p14="http://schemas.microsoft.com/office/powerpoint/2010/main" val="709812516"/>
-      </p:ext>
-    </p:extLst>
-  </p:cSld>
-  <p:clrMapOvr>
-    <a:masterClrMapping/>
-  </p:clrMapOvr>
-</p:sld>
-</file>
-
 <file path=ppt/slides/slide6.xml><?xml version="1.0" encoding="utf-8"?>
 <p:sld xmlns:a="http://schemas.openxmlformats.org/drawingml/2006/main" xmlns:r="http://schemas.openxmlformats.org/officeDocument/2006/relationships" xmlns:p="http://schemas.openxmlformats.org/presentationml/2006/main">
   <p:cSld>
@@ -3676,7 +3724,7 @@
       </p:sp>
       <p:pic>
         <p:nvPicPr>
-          <p:cNvPr id="4" name="Content Placeholder 3" descr="9148623-16984889-thumbnail.jpg"/>
+          <p:cNvPr id="4" name="Content Placeholder 3" descr="dsc_5296.jpg"/>
           <p:cNvPicPr>
             <a:picLocks noGrp="1" noChangeAspect="1"/>
           </p:cNvPicPr>
@@ -3692,7 +3740,7 @@
               </a:ext>
             </a:extLst>
           </a:blip>
-          <a:srcRect l="-12368" r="-12368"/>
+          <a:srcRect l="-10335" r="-10335"/>
           <a:stretch>
             <a:fillRect/>
           </a:stretch>
@@ -3702,7 +3750,7 @@
     </p:spTree>
     <p:extLst>
       <p:ext uri="{BB962C8B-B14F-4D97-AF65-F5344CB8AC3E}">
-        <p14:creationId xmlns:p14="http://schemas.microsoft.com/office/powerpoint/2010/main" val="1180285814"/>
+        <p14:creationId xmlns:p14="http://schemas.microsoft.com/office/powerpoint/2010/main" val="709812516"/>
       </p:ext>
     </p:extLst>
   </p:cSld>
@@ -3739,38 +3787,61 @@
             <p:ph type="title"/>
           </p:nvPr>
         </p:nvSpPr>
-        <p:spPr>
-          <a:xfrm>
-            <a:off x="457200" y="2814848"/>
-            <a:ext cx="8229600" cy="1143000"/>
-          </a:xfrm>
-        </p:spPr>
-        <p:txBody>
-          <a:bodyPr>
-            <a:normAutofit fontScale="90000"/>
-          </a:bodyPr>
-          <a:lstStyle/>
-          <a:p>
-            <a:r>
-              <a:rPr lang="en-US" dirty="0" smtClean="0">
-                <a:hlinkClick r:id="rId2"/>
-              </a:rPr>
-              <a:t>What here is chart junk, if anything?</a:t>
+        <p:spPr/>
+        <p:txBody>
+          <a:bodyPr/>
+          <a:lstStyle/>
+          <a:p>
+            <a:r>
+              <a:rPr lang="en-US" dirty="0" smtClean="0"/>
+              <a:t>Chart junk</a:t>
             </a:r>
             <a:endParaRPr lang="en-US" dirty="0"/>
           </a:p>
         </p:txBody>
       </p:sp>
+      <p:pic>
+        <p:nvPicPr>
+          <p:cNvPr id="4" name="Content Placeholder 3" descr="9148623-16984889-thumbnail.jpg"/>
+          <p:cNvPicPr>
+            <a:picLocks noGrp="1" noChangeAspect="1"/>
+          </p:cNvPicPr>
+          <p:nvPr>
+            <p:ph idx="1"/>
+          </p:nvPr>
+        </p:nvPicPr>
+        <p:blipFill>
+          <a:blip r:embed="rId2">
+            <a:extLst>
+              <a:ext uri="{28A0092B-C50C-407E-A947-70E740481C1C}">
+                <a14:useLocalDpi xmlns:a14="http://schemas.microsoft.com/office/drawing/2010/main" val="0"/>
+              </a:ext>
+            </a:extLst>
+          </a:blip>
+          <a:srcRect l="-12368" r="-12368"/>
+          <a:stretch>
+            <a:fillRect/>
+          </a:stretch>
+        </p:blipFill>
+        <p:spPr/>
+      </p:pic>
     </p:spTree>
     <p:extLst>
       <p:ext uri="{BB962C8B-B14F-4D97-AF65-F5344CB8AC3E}">
-        <p14:creationId xmlns:p14="http://schemas.microsoft.com/office/powerpoint/2010/main" val="3883612016"/>
+        <p14:creationId xmlns:p14="http://schemas.microsoft.com/office/powerpoint/2010/main" val="1180285814"/>
       </p:ext>
     </p:extLst>
   </p:cSld>
   <p:clrMapOvr>
     <a:masterClrMapping/>
   </p:clrMapOvr>
+  <p:timing>
+    <p:tnLst>
+      <p:par>
+        <p:cTn xmlns:p14="http://schemas.microsoft.com/office/powerpoint/2010/main" id="1" dur="indefinite" restart="never" nodeType="tmRoot"/>
+      </p:par>
+    </p:tnLst>
+  </p:timing>
 </p:sld>
 </file>
 
@@ -3801,54 +3872,45 @@
             <p:ph type="title"/>
           </p:nvPr>
         </p:nvSpPr>
-        <p:spPr/>
-        <p:txBody>
-          <a:bodyPr/>
-          <a:lstStyle/>
-          <a:p>
-            <a:r>
-              <a:rPr lang="en-US" dirty="0" smtClean="0"/>
-              <a:t>Chart junk?</a:t>
+        <p:spPr>
+          <a:xfrm>
+            <a:off x="457200" y="2814848"/>
+            <a:ext cx="8229600" cy="1143000"/>
+          </a:xfrm>
+        </p:spPr>
+        <p:txBody>
+          <a:bodyPr>
+            <a:normAutofit fontScale="90000"/>
+          </a:bodyPr>
+          <a:lstStyle/>
+          <a:p>
+            <a:r>
+              <a:rPr lang="en-US" dirty="0" smtClean="0">
+                <a:hlinkClick r:id="rId2"/>
+              </a:rPr>
+              <a:t>What here is chart junk, if anything?</a:t>
             </a:r>
             <a:endParaRPr lang="en-US" dirty="0"/>
           </a:p>
         </p:txBody>
       </p:sp>
-      <p:pic>
-        <p:nvPicPr>
-          <p:cNvPr id="4" name="Content Placeholder 3" descr="F1.large.jpg"/>
-          <p:cNvPicPr>
-            <a:picLocks noGrp="1" noChangeAspect="1"/>
-          </p:cNvPicPr>
-          <p:nvPr>
-            <p:ph idx="1"/>
-          </p:nvPr>
-        </p:nvPicPr>
-        <p:blipFill>
-          <a:blip r:embed="rId2">
-            <a:extLst>
-              <a:ext uri="{28A0092B-C50C-407E-A947-70E740481C1C}">
-                <a14:useLocalDpi xmlns:a14="http://schemas.microsoft.com/office/drawing/2010/main" val="0"/>
-              </a:ext>
-            </a:extLst>
-          </a:blip>
-          <a:srcRect l="-3768" r="-3768"/>
-          <a:stretch>
-            <a:fillRect/>
-          </a:stretch>
-        </p:blipFill>
-        <p:spPr/>
-      </p:pic>
     </p:spTree>
     <p:extLst>
       <p:ext uri="{BB962C8B-B14F-4D97-AF65-F5344CB8AC3E}">
-        <p14:creationId xmlns:p14="http://schemas.microsoft.com/office/powerpoint/2010/main" val="3003554953"/>
+        <p14:creationId xmlns:p14="http://schemas.microsoft.com/office/powerpoint/2010/main" val="3883612016"/>
       </p:ext>
     </p:extLst>
   </p:cSld>
   <p:clrMapOvr>
     <a:masterClrMapping/>
   </p:clrMapOvr>
+  <p:timing>
+    <p:tnLst>
+      <p:par>
+        <p:cTn xmlns:p14="http://schemas.microsoft.com/office/powerpoint/2010/main" id="1" dur="indefinite" restart="never" nodeType="tmRoot"/>
+      </p:par>
+    </p:tnLst>
+  </p:timing>
 </p:sld>
 </file>
 
@@ -3879,34 +3941,61 @@
             <p:ph type="title"/>
           </p:nvPr>
         </p:nvSpPr>
-        <p:spPr>
-          <a:xfrm>
-            <a:off x="457200" y="2814848"/>
-            <a:ext cx="8229600" cy="1143000"/>
-          </a:xfrm>
-        </p:spPr>
+        <p:spPr/>
         <p:txBody>
           <a:bodyPr/>
           <a:lstStyle/>
           <a:p>
             <a:r>
               <a:rPr lang="en-US" dirty="0" smtClean="0"/>
-              <a:t>Erasing exercise</a:t>
+              <a:t>Chart junk?</a:t>
             </a:r>
             <a:endParaRPr lang="en-US" dirty="0"/>
           </a:p>
         </p:txBody>
       </p:sp>
+      <p:pic>
+        <p:nvPicPr>
+          <p:cNvPr id="4" name="Content Placeholder 3" descr="F1.large.jpg"/>
+          <p:cNvPicPr>
+            <a:picLocks noGrp="1" noChangeAspect="1"/>
+          </p:cNvPicPr>
+          <p:nvPr>
+            <p:ph idx="1"/>
+          </p:nvPr>
+        </p:nvPicPr>
+        <p:blipFill>
+          <a:blip r:embed="rId2">
+            <a:extLst>
+              <a:ext uri="{28A0092B-C50C-407E-A947-70E740481C1C}">
+                <a14:useLocalDpi xmlns:a14="http://schemas.microsoft.com/office/drawing/2010/main" val="0"/>
+              </a:ext>
+            </a:extLst>
+          </a:blip>
+          <a:srcRect l="-3768" r="-3768"/>
+          <a:stretch>
+            <a:fillRect/>
+          </a:stretch>
+        </p:blipFill>
+        <p:spPr/>
+      </p:pic>
     </p:spTree>
     <p:extLst>
       <p:ext uri="{BB962C8B-B14F-4D97-AF65-F5344CB8AC3E}">
-        <p14:creationId xmlns:p14="http://schemas.microsoft.com/office/powerpoint/2010/main" val="544531581"/>
+        <p14:creationId xmlns:p14="http://schemas.microsoft.com/office/powerpoint/2010/main" val="3003554953"/>
       </p:ext>
     </p:extLst>
   </p:cSld>
   <p:clrMapOvr>
     <a:masterClrMapping/>
   </p:clrMapOvr>
+  <p:timing>
+    <p:tnLst>
+      <p:par>
+        <p:cTn xmlns:p14="http://schemas.microsoft.com/office/powerpoint/2010/main" id="1" dur="indefinite" restart="never" nodeType="tmRoot"/>
+      </p:par>
+    </p:tnLst>
+  </p:timing>
 </p:sld>
 </file>
 

</xml_diff>